<commit_message>
Updated Basic rule names in skyscrapers powerpoint.
</commit_message>
<xml_diff>
--- a/misc/Rules/Skyscrapers.pptx
+++ b/misc/Rules/Skyscrapers.pptx
@@ -237,7 +237,7 @@
           <a:p>
             <a:fld id="{2D21EF99-F28B-40D0-9617-1BBA90290483}" type="datetimeFigureOut">
               <a:rPr lang="en-US" smtClean="0"/>
-              <a:t>9/30/2014</a:t>
+              <a:t>10/7/2014</a:t>
             </a:fld>
             <a:endParaRPr lang="en-US"/>
           </a:p>
@@ -463,7 +463,7 @@
           <a:p>
             <a:fld id="{2D21EF99-F28B-40D0-9617-1BBA90290483}" type="datetimeFigureOut">
               <a:rPr lang="en-US" smtClean="0"/>
-              <a:t>9/30/2014</a:t>
+              <a:t>10/7/2014</a:t>
             </a:fld>
             <a:endParaRPr lang="en-US"/>
           </a:p>
@@ -638,7 +638,7 @@
           <a:p>
             <a:fld id="{2D21EF99-F28B-40D0-9617-1BBA90290483}" type="datetimeFigureOut">
               <a:rPr lang="en-US" smtClean="0"/>
-              <a:t>9/30/2014</a:t>
+              <a:t>10/7/2014</a:t>
             </a:fld>
             <a:endParaRPr lang="en-US"/>
           </a:p>
@@ -803,7 +803,7 @@
           <a:p>
             <a:fld id="{2D21EF99-F28B-40D0-9617-1BBA90290483}" type="datetimeFigureOut">
               <a:rPr lang="en-US" smtClean="0"/>
-              <a:t>9/30/2014</a:t>
+              <a:t>10/7/2014</a:t>
             </a:fld>
             <a:endParaRPr lang="en-US"/>
           </a:p>
@@ -1047,7 +1047,7 @@
           <a:p>
             <a:fld id="{2D21EF99-F28B-40D0-9617-1BBA90290483}" type="datetimeFigureOut">
               <a:rPr lang="en-US" smtClean="0"/>
-              <a:t>9/30/2014</a:t>
+              <a:t>10/7/2014</a:t>
             </a:fld>
             <a:endParaRPr lang="en-US"/>
           </a:p>
@@ -1311,7 +1311,7 @@
           <a:p>
             <a:fld id="{2D21EF99-F28B-40D0-9617-1BBA90290483}" type="datetimeFigureOut">
               <a:rPr lang="en-US" smtClean="0"/>
-              <a:t>9/30/2014</a:t>
+              <a:t>10/7/2014</a:t>
             </a:fld>
             <a:endParaRPr lang="en-US"/>
           </a:p>
@@ -1685,7 +1685,7 @@
           <a:p>
             <a:fld id="{2D21EF99-F28B-40D0-9617-1BBA90290483}" type="datetimeFigureOut">
               <a:rPr lang="en-US" smtClean="0"/>
-              <a:t>9/30/2014</a:t>
+              <a:t>10/7/2014</a:t>
             </a:fld>
             <a:endParaRPr lang="en-US"/>
           </a:p>
@@ -1798,7 +1798,7 @@
           <a:p>
             <a:fld id="{2D21EF99-F28B-40D0-9617-1BBA90290483}" type="datetimeFigureOut">
               <a:rPr lang="en-US" smtClean="0"/>
-              <a:t>9/30/2014</a:t>
+              <a:t>10/7/2014</a:t>
             </a:fld>
             <a:endParaRPr lang="en-US"/>
           </a:p>
@@ -1888,7 +1888,7 @@
           <a:p>
             <a:fld id="{2D21EF99-F28B-40D0-9617-1BBA90290483}" type="datetimeFigureOut">
               <a:rPr lang="en-US" smtClean="0"/>
-              <a:t>9/30/2014</a:t>
+              <a:t>10/7/2014</a:t>
             </a:fld>
             <a:endParaRPr lang="en-US"/>
           </a:p>
@@ -2146,7 +2146,7 @@
           <a:p>
             <a:fld id="{2D21EF99-F28B-40D0-9617-1BBA90290483}" type="datetimeFigureOut">
               <a:rPr lang="en-US" smtClean="0"/>
-              <a:t>9/30/2014</a:t>
+              <a:t>10/7/2014</a:t>
             </a:fld>
             <a:endParaRPr lang="en-US"/>
           </a:p>
@@ -2410,7 +2410,7 @@
           <a:p>
             <a:fld id="{2D21EF99-F28B-40D0-9617-1BBA90290483}" type="datetimeFigureOut">
               <a:rPr lang="en-US" smtClean="0"/>
-              <a:t>9/30/2014</a:t>
+              <a:t>10/7/2014</a:t>
             </a:fld>
             <a:endParaRPr lang="en-US"/>
           </a:p>
@@ -2627,7 +2627,7 @@
           <a:p>
             <a:fld id="{2D21EF99-F28B-40D0-9617-1BBA90290483}" type="datetimeFigureOut">
               <a:rPr lang="en-US" smtClean="0"/>
-              <a:t>9/30/2014</a:t>
+              <a:t>10/7/2014</a:t>
             </a:fld>
             <a:endParaRPr lang="en-US"/>
           </a:p>
@@ -3148,7 +3148,11 @@
           <a:p>
             <a:r>
               <a:rPr lang="en-US" dirty="0" smtClean="0"/>
-              <a:t>Basic Rule: Forced by Elimination</a:t>
+              <a:t>Basic Rule: </a:t>
+            </a:r>
+            <a:r>
+              <a:rPr lang="en-US" dirty="0" smtClean="0"/>
+              <a:t>Last Square for Number</a:t>
             </a:r>
             <a:endParaRPr lang="en-US" dirty="0"/>
           </a:p>
@@ -3320,7 +3324,15 @@
           <a:p>
             <a:r>
               <a:rPr lang="en-US" dirty="0" smtClean="0"/>
-              <a:t>Basic Rule: Forced by Deduction</a:t>
+              <a:t>Basic Rule: </a:t>
+            </a:r>
+            <a:r>
+              <a:rPr lang="en-US" dirty="0" smtClean="0"/>
+              <a:t>Last Number </a:t>
+            </a:r>
+            <a:r>
+              <a:rPr lang="en-US" smtClean="0"/>
+              <a:t>for Square</a:t>
             </a:r>
             <a:endParaRPr lang="en-US" dirty="0"/>
           </a:p>

</xml_diff>